<commit_message>
Started the p1 writeup.
</commit_message>
<xml_diff>
--- a/Presentation.pptx
+++ b/Presentation.pptx
@@ -8022,12 +8022,12 @@
           <a:lstStyle/>
           <a:p>
             <a:r>
-              <a:rPr lang="en-US" sz="4000" dirty="0">
+              <a:rPr lang="en-US" sz="4000">
                 <a:solidFill>
                   <a:srgbClr val="FFFFFF"/>
                 </a:solidFill>
               </a:rPr>
-              <a:t>Razor </a:t>
+              <a:t>Razer </a:t>
             </a:r>
             <a:r>
               <a:rPr lang="en-US" sz="4000" kern="1200" dirty="0">

</xml_diff>